<commit_message>
working with new etl package
</commit_message>
<xml_diff>
--- a/dashboard_builders/subscriptions_dashboard.pptx
+++ b/dashboard_builders/subscriptions_dashboard.pptx
@@ -259,7 +259,7 @@
           <a:p>
             <a:fld id="{2AB76952-FFEA-4926-B5E6-FE62E946DB4A}" type="datetimeFigureOut">
               <a:rPr lang="en-US" smtClean="0"/>
-              <a:t>9/10/2019</a:t>
+              <a:t>9/17/2019</a:t>
             </a:fld>
             <a:endParaRPr lang="en-US"/>
           </a:p>
@@ -457,7 +457,7 @@
           <a:p>
             <a:fld id="{2AB76952-FFEA-4926-B5E6-FE62E946DB4A}" type="datetimeFigureOut">
               <a:rPr lang="en-US" smtClean="0"/>
-              <a:t>9/10/2019</a:t>
+              <a:t>9/17/2019</a:t>
             </a:fld>
             <a:endParaRPr lang="en-US"/>
           </a:p>
@@ -665,7 +665,7 @@
           <a:p>
             <a:fld id="{2AB76952-FFEA-4926-B5E6-FE62E946DB4A}" type="datetimeFigureOut">
               <a:rPr lang="en-US" smtClean="0"/>
-              <a:t>9/10/2019</a:t>
+              <a:t>9/17/2019</a:t>
             </a:fld>
             <a:endParaRPr lang="en-US"/>
           </a:p>
@@ -863,7 +863,7 @@
           <a:p>
             <a:fld id="{2AB76952-FFEA-4926-B5E6-FE62E946DB4A}" type="datetimeFigureOut">
               <a:rPr lang="en-US" smtClean="0"/>
-              <a:t>9/10/2019</a:t>
+              <a:t>9/17/2019</a:t>
             </a:fld>
             <a:endParaRPr lang="en-US"/>
           </a:p>
@@ -1138,7 +1138,7 @@
           <a:p>
             <a:fld id="{2AB76952-FFEA-4926-B5E6-FE62E946DB4A}" type="datetimeFigureOut">
               <a:rPr lang="en-US" smtClean="0"/>
-              <a:t>9/10/2019</a:t>
+              <a:t>9/17/2019</a:t>
             </a:fld>
             <a:endParaRPr lang="en-US"/>
           </a:p>
@@ -1403,7 +1403,7 @@
           <a:p>
             <a:fld id="{2AB76952-FFEA-4926-B5E6-FE62E946DB4A}" type="datetimeFigureOut">
               <a:rPr lang="en-US" smtClean="0"/>
-              <a:t>9/10/2019</a:t>
+              <a:t>9/17/2019</a:t>
             </a:fld>
             <a:endParaRPr lang="en-US"/>
           </a:p>
@@ -1815,7 +1815,7 @@
           <a:p>
             <a:fld id="{2AB76952-FFEA-4926-B5E6-FE62E946DB4A}" type="datetimeFigureOut">
               <a:rPr lang="en-US" smtClean="0"/>
-              <a:t>9/10/2019</a:t>
+              <a:t>9/17/2019</a:t>
             </a:fld>
             <a:endParaRPr lang="en-US"/>
           </a:p>
@@ -1956,7 +1956,7 @@
           <a:p>
             <a:fld id="{2AB76952-FFEA-4926-B5E6-FE62E946DB4A}" type="datetimeFigureOut">
               <a:rPr lang="en-US" smtClean="0"/>
-              <a:t>9/10/2019</a:t>
+              <a:t>9/17/2019</a:t>
             </a:fld>
             <a:endParaRPr lang="en-US"/>
           </a:p>
@@ -2069,7 +2069,7 @@
           <a:p>
             <a:fld id="{2AB76952-FFEA-4926-B5E6-FE62E946DB4A}" type="datetimeFigureOut">
               <a:rPr lang="en-US" smtClean="0"/>
-              <a:t>9/10/2019</a:t>
+              <a:t>9/17/2019</a:t>
             </a:fld>
             <a:endParaRPr lang="en-US"/>
           </a:p>
@@ -2380,7 +2380,7 @@
           <a:p>
             <a:fld id="{2AB76952-FFEA-4926-B5E6-FE62E946DB4A}" type="datetimeFigureOut">
               <a:rPr lang="en-US" smtClean="0"/>
-              <a:t>9/10/2019</a:t>
+              <a:t>9/17/2019</a:t>
             </a:fld>
             <a:endParaRPr lang="en-US"/>
           </a:p>
@@ -2668,7 +2668,7 @@
           <a:p>
             <a:fld id="{2AB76952-FFEA-4926-B5E6-FE62E946DB4A}" type="datetimeFigureOut">
               <a:rPr lang="en-US" smtClean="0"/>
-              <a:t>9/10/2019</a:t>
+              <a:t>9/17/2019</a:t>
             </a:fld>
             <a:endParaRPr lang="en-US"/>
           </a:p>
@@ -2909,7 +2909,7 @@
           <a:p>
             <a:fld id="{2AB76952-FFEA-4926-B5E6-FE62E946DB4A}" type="datetimeFigureOut">
               <a:rPr lang="en-US" smtClean="0"/>
-              <a:t>9/10/2019</a:t>
+              <a:t>9/17/2019</a:t>
             </a:fld>
             <a:endParaRPr lang="en-US"/>
           </a:p>
@@ -3409,9 +3409,7 @@
           </a:solidFill>
           <a:ln>
             <a:solidFill>
-              <a:schemeClr val="accent6">
-                <a:lumMod val="50000"/>
-              </a:schemeClr>
+              <a:schemeClr val="tx1"/>
             </a:solidFill>
           </a:ln>
         </p:spPr>
@@ -3561,11 +3559,9 @@
               <a:lumOff val="5000"/>
             </a:schemeClr>
           </a:solidFill>
-          <a:ln>
+          <a:ln w="12700">
             <a:solidFill>
-              <a:schemeClr val="accent6">
-                <a:lumMod val="50000"/>
-              </a:schemeClr>
+              <a:schemeClr val="tx1"/>
             </a:solidFill>
           </a:ln>
         </p:spPr>
@@ -4301,11 +4297,9 @@
               <a:lumMod val="50000"/>
             </a:schemeClr>
           </a:solidFill>
-          <a:ln>
+          <a:ln w="12700">
             <a:solidFill>
-              <a:schemeClr val="accent2">
-                <a:lumMod val="50000"/>
-              </a:schemeClr>
+              <a:schemeClr val="tx1"/>
             </a:solidFill>
           </a:ln>
         </p:spPr>
@@ -4341,7 +4335,7 @@
         </p:nvSpPr>
         <p:spPr>
           <a:xfrm>
-            <a:off x="108378" y="5356865"/>
+            <a:off x="103876" y="5356864"/>
             <a:ext cx="5939338" cy="1381546"/>
           </a:xfrm>
           <a:prstGeom prst="rect">
@@ -4355,9 +4349,7 @@
           </a:solidFill>
           <a:ln>
             <a:solidFill>
-              <a:schemeClr val="accent2">
-                <a:lumMod val="50000"/>
-              </a:schemeClr>
+              <a:schemeClr val="tx1"/>
             </a:solidFill>
           </a:ln>
         </p:spPr>
@@ -4470,11 +4462,9 @@
               <a:lumMod val="50000"/>
             </a:schemeClr>
           </a:solidFill>
-          <a:ln>
+          <a:ln w="12700">
             <a:solidFill>
-              <a:schemeClr val="accent1">
-                <a:lumMod val="50000"/>
-              </a:schemeClr>
+              <a:schemeClr val="tx1"/>
             </a:solidFill>
           </a:ln>
         </p:spPr>
@@ -4510,7 +4500,7 @@
         </p:nvSpPr>
         <p:spPr>
           <a:xfrm>
-            <a:off x="6147938" y="3892877"/>
+            <a:off x="6147938" y="3886242"/>
             <a:ext cx="5939338" cy="2852168"/>
           </a:xfrm>
           <a:prstGeom prst="rect">
@@ -4524,9 +4514,7 @@
           </a:solidFill>
           <a:ln>
             <a:solidFill>
-              <a:schemeClr val="accent1">
-                <a:lumMod val="50000"/>
-              </a:schemeClr>
+              <a:schemeClr val="tx1"/>
             </a:solidFill>
           </a:ln>
         </p:spPr>
@@ -4864,8 +4852,8 @@
         </p:blipFill>
         <p:spPr bwMode="auto">
           <a:xfrm>
-            <a:off x="6147938" y="1053071"/>
-            <a:ext cx="5974533" cy="2248045"/>
+            <a:off x="6159021" y="1053072"/>
+            <a:ext cx="5928256" cy="2230632"/>
           </a:xfrm>
           <a:prstGeom prst="rect">
             <a:avLst/>
@@ -4873,6 +4861,11 @@
           <a:solidFill>
             <a:schemeClr val="bg1"/>
           </a:solidFill>
+          <a:ln w="12700">
+            <a:solidFill>
+              <a:schemeClr val="tx1"/>
+            </a:solidFill>
+          </a:ln>
         </p:spPr>
       </p:pic>
       <p:sp>
@@ -4900,11 +4893,9 @@
               <a:lumMod val="50000"/>
             </a:schemeClr>
           </a:solidFill>
-          <a:ln>
+          <a:ln w="12700">
             <a:solidFill>
-              <a:schemeClr val="accent6">
-                <a:lumMod val="50000"/>
-              </a:schemeClr>
+              <a:schemeClr val="tx1"/>
             </a:solidFill>
           </a:ln>
         </p:spPr>

</xml_diff>